<commit_message>
draft isometric() and symmetric()
</commit_message>
<xml_diff>
--- a/inst/extdata/modeling/diagnostics.pptx
+++ b/inst/extdata/modeling/diagnostics.pptx
@@ -3185,7 +3185,7 @@
             </a:pPr>
             <a:r>
               <a:rPr/>
-              <a:t>22 August, 2022</a:t>
+              <a:t>23 August, 2022</a:t>
             </a:r>
           </a:p>
         </p:txBody>
@@ -3292,7 +3292,7 @@
             </a:pPr>
             <a:r>
               <a:rPr/>
-              <a:t>x %&gt;% trendpair(IWRES, TIME, IWRES, TIME, trans2 = c(‘identity’, ‘log10’))</a:t>
+              <a:t>x %&gt;% trendpair(IWRES, TIME, IWRES, TIME, trans2 = c(‘identity’, ‘log10’), symmetric = TRUE)</a:t>
             </a:r>
           </a:p>
         </p:txBody>
@@ -4401,7 +4401,7 @@
             </a:pPr>
             <a:r>
               <a:rPr/>
-              <a:t>x %&gt;% trendplot(IWRES, TIME)</a:t>
+              <a:t>x %&gt;% trendplot(IWRES, TIME) + symmetric()</a:t>
             </a:r>
           </a:p>
         </p:txBody>

</xml_diff>